<commit_message>
fixed position & from
</commit_message>
<xml_diff>
--- a/파이썬_세미나_ppt_완료.pptx
+++ b/파이썬_세미나_ppt_완료.pptx
@@ -2,7 +2,7 @@
 <file path=ppt/presentation.xml><?xml version="1.0" encoding="utf-8"?>
 <p:presentation xmlns:a="http://schemas.openxmlformats.org/drawingml/2006/main" xmlns:r="http://schemas.openxmlformats.org/officeDocument/2006/relationships" xmlns:p="http://schemas.openxmlformats.org/presentationml/2006/main" xmlns:p14="http://schemas.microsoft.com/office/powerpoint/2010/main" saveSubsetFonts="1">
   <p:sldMasterIdLst>
-    <p:sldMasterId id="2147483913" r:id="rId13"/>
+    <p:sldMasterId id="2147483915" r:id="rId13"/>
   </p:sldMasterIdLst>
   <p:sldIdLst>
     <p:sldId id="278" r:id="rId15"/>
@@ -72,22 +72,22 @@
     </p:ext>
     <p:ext uri="{EFAFB233-063F-42B5-8137-9DF3F51BA10A}">
       <p15:sldGuideLst xmlns:p15="http://schemas.microsoft.com/office/powerpoint/2012/main">
-        <p15:guide id="0" pos="3823" userDrawn="1">
+        <p15:guide id="0" pos="3822" userDrawn="1">
           <p15:clr>
             <a:srgbClr val="A4A3A4"/>
           </p15:clr>
         </p15:guide>
-        <p15:guide id="1" orient="horz" pos="2148" userDrawn="1">
+        <p15:guide id="1" orient="horz" pos="2147" userDrawn="1">
           <p15:clr>
             <a:srgbClr val="A4A3A4"/>
           </p15:clr>
         </p15:guide>
-        <p15:guide id="4" orient="horz" pos="2448" userDrawn="1">
+        <p15:guide id="4" orient="horz" pos="2447" userDrawn="1">
           <p15:clr>
             <a:srgbClr val="A4A3A4"/>
           </p15:clr>
         </p15:guide>
-        <p15:guide id="4" pos="3923" userDrawn="1">
+        <p15:guide id="4" pos="3922" userDrawn="1">
           <p15:clr>
             <a:srgbClr val="A4A3A4"/>
           </p15:clr>
@@ -6893,7 +6893,7 @@
 </file>
 
 <file path=ppt/slides/slide12.xml><?xml version="1.0" encoding="utf-8"?>
-<p:sld xmlns:a="http://schemas.openxmlformats.org/drawingml/2006/main" xmlns:r="http://schemas.openxmlformats.org/officeDocument/2006/relationships" xmlns:p="http://schemas.openxmlformats.org/presentationml/2006/main">
+<p:sld xmlns:a="http://schemas.openxmlformats.org/drawingml/2006/main" xmlns:r="http://schemas.openxmlformats.org/officeDocument/2006/relationships" xmlns:p="http://schemas.openxmlformats.org/presentationml/2006/main" xmlns:p14="http://schemas.microsoft.com/office/powerpoint/2010/main">
   <p:cSld>
     <p:spTree>
       <p:nvGrpSpPr>
@@ -6918,9 +6918,9 @@
           <p:nvPr/>
         </p:nvSpPr>
         <p:spPr>
-          <a:xfrm rot="0">
+          <a:xfrm>
             <a:off x="441325" y="267970"/>
-            <a:ext cx="5009515" cy="4523105"/>
+            <a:ext cx="5010150" cy="4246245"/>
           </a:xfrm>
           <a:prstGeom prst="rect"/>
           <a:noFill/>
@@ -6930,7 +6930,7 @@
           </a:ln>
         </p:spPr>
         <p:txBody>
-          <a:bodyPr wrap="square" lIns="89535" tIns="46355" rIns="89535" bIns="46355" vert="horz" anchor="t">
+          <a:bodyPr wrap="square" lIns="89535" tIns="46355" rIns="89535" bIns="46355" numCol="1" vert="horz" anchor="t">
             <a:spAutoFit/>
           </a:bodyPr>
           <a:lstStyle/>
@@ -7120,25 +7120,6 @@
                 <a:ea typeface="맑은 고딕" charset="0"/>
               </a:rPr>
             </a:br>
-            <a:endParaRPr lang="ko-KR" altLang="en-US" sz="1800" cap="none" dirty="0" smtClean="0" b="0" strike="noStrike">
-              <a:latin typeface="맑은 고딕" charset="0"/>
-              <a:ea typeface="맑은 고딕" charset="0"/>
-            </a:endParaRPr>
-          </a:p>
-          <a:p>
-            <a:pPr marL="0" indent="0" algn="l" fontAlgn="auto" defTabSz="508000" eaLnBrk="0" latinLnBrk="0">
-              <a:lnSpc>
-                <a:spcPct val="100000"/>
-              </a:lnSpc>
-              <a:spcBef>
-                <a:spcPts val="0"/>
-              </a:spcBef>
-              <a:spcAft>
-                <a:spcPts val="0"/>
-              </a:spcAft>
-              <a:buFontTx/>
-              <a:buNone/>
-            </a:pPr>
             <a:endParaRPr lang="ko-KR" altLang="en-US" sz="1800" cap="none" dirty="0" smtClean="0" b="0" strike="noStrike">
               <a:latin typeface="맑은 고딕" charset="0"/>
               <a:ea typeface="맑은 고딕" charset="0"/>
@@ -7497,7 +7478,7 @@
       </p:grpSp>
       <p:pic>
         <p:nvPicPr>
-          <p:cNvPr id="16" name="그림 15" descr="C:/Users/PAUL/AppData/Roaming/PolarisOffice/ETemp/1160_48387312/fImage48642559358.png"/>
+          <p:cNvPr id="16" name="그림 15"/>
           <p:cNvPicPr>
             <a:picLocks noChangeAspect="1"/>
           </p:cNvPicPr>
@@ -7526,7 +7507,7 @@
       </p:pic>
       <p:pic>
         <p:nvPicPr>
-          <p:cNvPr id="17" name="그림 16" descr="C:/Users/PAUL/AppData/Roaming/PolarisOffice/ETemp/1160_48387312/fImage6842566962.png"/>
+          <p:cNvPr id="17" name="그림 16"/>
           <p:cNvPicPr>
             <a:picLocks noChangeAspect="1"/>
           </p:cNvPicPr>
@@ -7555,7 +7536,7 @@
       </p:pic>
       <p:pic>
         <p:nvPicPr>
-          <p:cNvPr id="18" name="그림 17" descr="C:/Users/PAUL/AppData/Roaming/PolarisOffice/ETemp/1160_48387312/fImage6792574464.png"/>
+          <p:cNvPr id="18" name="그림 17"/>
           <p:cNvPicPr>
             <a:picLocks noChangeAspect="1"/>
           </p:cNvPicPr>
@@ -7584,7 +7565,7 @@
       </p:pic>
       <p:pic>
         <p:nvPicPr>
-          <p:cNvPr id="19" name="그림 18" descr="C:/Users/PAUL/AppData/Roaming/PolarisOffice/ETemp/1160_48387312/fImage65232585705.png"/>
+          <p:cNvPr id="19" name="그림 18"/>
           <p:cNvPicPr>
             <a:picLocks noChangeAspect="1"/>
           </p:cNvPicPr>
@@ -7613,7 +7594,7 @@
       </p:pic>
       <p:pic>
         <p:nvPicPr>
-          <p:cNvPr id="20" name="그림 19" descr="C:/Users/PAUL/AppData/Roaming/PolarisOffice/ETemp/1160_48387312/fImage69132598145.png"/>
+          <p:cNvPr id="20" name="그림 19" descr="C:/Users/PAUL/AppData/Roaming/PolarisOffice/ETemp/10120_51544248/fImage69132598145.png"/>
           <p:cNvPicPr>
             <a:picLocks noChangeAspect="1"/>
           </p:cNvPicPr>
@@ -7627,14 +7608,15 @@
               </a:ext>
             </a:extLst>
           </a:blip>
+          <a:srcRect/>
           <a:stretch>
             <a:fillRect/>
           </a:stretch>
         </p:blipFill>
         <p:spPr>
           <a:xfrm rot="0">
-            <a:off x="439420" y="4518660"/>
-            <a:ext cx="3382010" cy="2343785"/>
+            <a:off x="439420" y="4285615"/>
+            <a:ext cx="3382645" cy="2344420"/>
           </a:xfrm>
           <a:prstGeom prst="rect"/>
           <a:noFill/>
@@ -8141,6 +8123,168 @@
           </p:txBody>
         </p:sp>
       </p:grpSp>
+      <p:sp>
+        <p:nvSpPr>
+          <p:cNvPr id="11" name="텍스트 상자 10"/>
+          <p:cNvSpPr txBox="1">
+            <a:spLocks/>
+          </p:cNvSpPr>
+          <p:nvPr/>
+        </p:nvSpPr>
+        <p:spPr>
+          <a:xfrm rot="0">
+            <a:off x="431800" y="6018530"/>
+            <a:ext cx="5894705" cy="738505"/>
+          </a:xfrm>
+          <a:prstGeom prst="rect"/>
+          <a:noFill/>
+        </p:spPr>
+        <p:txBody>
+          <a:bodyPr wrap="square" lIns="0" tIns="0" rIns="0" bIns="0" vert="horz" anchor="t">
+            <a:noAutofit/>
+          </a:bodyPr>
+          <a:lstStyle/>
+          <a:p>
+            <a:pPr marL="0" indent="0" algn="ctr" fontAlgn="auto" defTabSz="508000">
+              <a:lnSpc>
+                <a:spcPct val="100000"/>
+              </a:lnSpc>
+              <a:spcBef>
+                <a:spcPts val="0"/>
+              </a:spcBef>
+              <a:spcAft>
+                <a:spcPts val="0"/>
+              </a:spcAft>
+              <a:buFontTx/>
+              <a:buNone/>
+            </a:pPr>
+            <a:r>
+              <a:rPr lang="en-US" altLang="ko-KR" sz="1000" cap="none" dirty="0" smtClean="0" b="0" strike="noStrike">
+                <a:solidFill>
+                  <a:schemeClr val="accent1">
+                    <a:lumMod val="75000"/>
+                    <a:lumOff val="0"/>
+                  </a:schemeClr>
+                </a:solidFill>
+                <a:latin typeface="맑은 고딕" charset="0"/>
+                <a:ea typeface="맑은 고딕" charset="0"/>
+              </a:rPr>
+              <a:t>http://www.realhanbit.co.kr/books/53/pages/608/preview - 파이썬 키워드 표</a:t>
+            </a:r>
+            <a:endParaRPr lang="ko-KR" altLang="en-US" sz="1000" cap="none" dirty="0" smtClean="0" b="0" strike="noStrike">
+              <a:solidFill>
+                <a:schemeClr val="accent1">
+                  <a:lumMod val="75000"/>
+                  <a:lumOff val="0"/>
+                </a:schemeClr>
+              </a:solidFill>
+              <a:latin typeface="맑은 고딕" charset="0"/>
+              <a:ea typeface="맑은 고딕" charset="0"/>
+            </a:endParaRPr>
+          </a:p>
+          <a:p>
+            <a:pPr marL="0" indent="0" algn="ctr" fontAlgn="auto" defTabSz="508000">
+              <a:lnSpc>
+                <a:spcPct val="100000"/>
+              </a:lnSpc>
+              <a:spcBef>
+                <a:spcPts val="0"/>
+              </a:spcBef>
+              <a:spcAft>
+                <a:spcPts val="0"/>
+              </a:spcAft>
+              <a:buFontTx/>
+              <a:buNone/>
+            </a:pPr>
+            <a:r>
+              <a:rPr lang="en-US" altLang="ko-KR" sz="1000" cap="none" dirty="0" smtClean="0" b="0" strike="noStrike">
+                <a:solidFill>
+                  <a:schemeClr val="accent1">
+                    <a:lumMod val="75000"/>
+                    <a:lumOff val="0"/>
+                  </a:schemeClr>
+                </a:solidFill>
+                <a:latin typeface="맑은 고딕" charset="0"/>
+                <a:ea typeface="맑은 고딕" charset="0"/>
+              </a:rPr>
+              <a:t>http://www.realhanbit.co.kr/books/53/pages/608/preview - 파이썬 식별자 규칙</a:t>
+            </a:r>
+            <a:endParaRPr lang="ko-KR" altLang="en-US" sz="1000" cap="none" dirty="0" smtClean="0" b="0" strike="noStrike">
+              <a:solidFill>
+                <a:schemeClr val="accent1">
+                  <a:lumMod val="75000"/>
+                  <a:lumOff val="0"/>
+                </a:schemeClr>
+              </a:solidFill>
+              <a:latin typeface="맑은 고딕" charset="0"/>
+              <a:ea typeface="맑은 고딕" charset="0"/>
+            </a:endParaRPr>
+          </a:p>
+          <a:p>
+            <a:pPr marL="0" indent="0" algn="ctr" fontAlgn="auto" defTabSz="508000">
+              <a:lnSpc>
+                <a:spcPct val="100000"/>
+              </a:lnSpc>
+              <a:spcBef>
+                <a:spcPts val="0"/>
+              </a:spcBef>
+              <a:spcAft>
+                <a:spcPts val="0"/>
+              </a:spcAft>
+              <a:buFontTx/>
+              <a:buNone/>
+            </a:pPr>
+            <a:r>
+              <a:rPr lang="en-US" altLang="ko-KR" sz="1000" cap="none" dirty="0" smtClean="0" b="0" strike="noStrike">
+                <a:solidFill>
+                  <a:schemeClr val="accent1">
+                    <a:lumMod val="75000"/>
+                    <a:lumOff val="0"/>
+                  </a:schemeClr>
+                </a:solidFill>
+                <a:latin typeface="맑은 고딕" charset="0"/>
+                <a:ea typeface="맑은 고딕" charset="0"/>
+              </a:rPr>
+              <a:t>http://devanix.tistory.com/70 - 연산자 우선순위 표</a:t>
+            </a:r>
+            <a:endParaRPr lang="ko-KR" altLang="en-US" sz="1000" cap="none" dirty="0" smtClean="0" b="0" strike="noStrike">
+              <a:solidFill>
+                <a:schemeClr val="accent1">
+                  <a:lumMod val="75000"/>
+                  <a:lumOff val="0"/>
+                </a:schemeClr>
+              </a:solidFill>
+              <a:latin typeface="맑은 고딕" charset="0"/>
+              <a:ea typeface="맑은 고딕" charset="0"/>
+            </a:endParaRPr>
+          </a:p>
+          <a:p>
+            <a:pPr marL="0" indent="0" algn="ctr" fontAlgn="auto" defTabSz="508000">
+              <a:lnSpc>
+                <a:spcPct val="100000"/>
+              </a:lnSpc>
+              <a:spcBef>
+                <a:spcPts val="0"/>
+              </a:spcBef>
+              <a:spcAft>
+                <a:spcPts val="0"/>
+              </a:spcAft>
+              <a:buFontTx/>
+              <a:buNone/>
+            </a:pPr>
+            <a:endParaRPr lang="ko-KR" altLang="en-US" sz="1800" cap="none" dirty="0" smtClean="0" b="0" strike="noStrike">
+              <a:solidFill>
+                <a:schemeClr val="accent1">
+                  <a:lumMod val="75000"/>
+                  <a:lumOff val="0"/>
+                </a:schemeClr>
+              </a:solidFill>
+              <a:latin typeface="맑은 고딕" charset="0"/>
+              <a:ea typeface="맑은 고딕" charset="0"/>
+            </a:endParaRPr>
+          </a:p>
+        </p:txBody>
+      </p:sp>
     </p:spTree>
   </p:cSld>
   <p:clrMapOvr>

</xml_diff>